<commit_message>
DATE : 2023-03-04 TIME: 11:30:21
</commit_message>
<xml_diff>
--- a/proker-bem/Tecnovation/Acara/KONSEP-ACARA/letak.pptx
+++ b/proker-bem/Tecnovation/Acara/KONSEP-ACARA/letak.pptx
@@ -108,6 +108,11 @@
       </a:defRPr>
     </a:lvl9pPr>
   </p:defaultTextStyle>
+  <p:extLst>
+    <p:ext uri="{EFAFB233-063F-42B5-8137-9DF3F51BA10A}">
+      <p15:sldGuideLst xmlns:p15="http://schemas.microsoft.com/office/powerpoint/2012/main"/>
+    </p:ext>
+  </p:extLst>
 </p:presentation>
 </file>
 
@@ -193,7 +198,7 @@
           <a:p>
             <a:fld id="{E1B0C086-A72A-43B7-A7F0-6D444F8086B6}" type="datetimeFigureOut">
               <a:rPr lang="en-ID" smtClean="0"/>
-              <a:t>17/02/2023</a:t>
+              <a:t>03/03/2023</a:t>
             </a:fld>
             <a:endParaRPr lang="en-ID"/>
           </a:p>
@@ -694,7 +699,7 @@
           <a:p>
             <a:fld id="{6640DF9F-1934-4AAD-B8C4-F17CDBD2A865}" type="datetimeFigureOut">
               <a:rPr lang="en-ID" smtClean="0"/>
-              <a:t>17/02/2023</a:t>
+              <a:t>03/03/2023</a:t>
             </a:fld>
             <a:endParaRPr lang="en-ID"/>
           </a:p>
@@ -894,7 +899,7 @@
           <a:p>
             <a:fld id="{6640DF9F-1934-4AAD-B8C4-F17CDBD2A865}" type="datetimeFigureOut">
               <a:rPr lang="en-ID" smtClean="0"/>
-              <a:t>17/02/2023</a:t>
+              <a:t>03/03/2023</a:t>
             </a:fld>
             <a:endParaRPr lang="en-ID"/>
           </a:p>
@@ -1104,7 +1109,7 @@
           <a:p>
             <a:fld id="{6640DF9F-1934-4AAD-B8C4-F17CDBD2A865}" type="datetimeFigureOut">
               <a:rPr lang="en-ID" smtClean="0"/>
-              <a:t>17/02/2023</a:t>
+              <a:t>03/03/2023</a:t>
             </a:fld>
             <a:endParaRPr lang="en-ID"/>
           </a:p>
@@ -1304,7 +1309,7 @@
           <a:p>
             <a:fld id="{6640DF9F-1934-4AAD-B8C4-F17CDBD2A865}" type="datetimeFigureOut">
               <a:rPr lang="en-ID" smtClean="0"/>
-              <a:t>17/02/2023</a:t>
+              <a:t>03/03/2023</a:t>
             </a:fld>
             <a:endParaRPr lang="en-ID"/>
           </a:p>
@@ -1580,7 +1585,7 @@
           <a:p>
             <a:fld id="{6640DF9F-1934-4AAD-B8C4-F17CDBD2A865}" type="datetimeFigureOut">
               <a:rPr lang="en-ID" smtClean="0"/>
-              <a:t>17/02/2023</a:t>
+              <a:t>03/03/2023</a:t>
             </a:fld>
             <a:endParaRPr lang="en-ID"/>
           </a:p>
@@ -1848,7 +1853,7 @@
           <a:p>
             <a:fld id="{6640DF9F-1934-4AAD-B8C4-F17CDBD2A865}" type="datetimeFigureOut">
               <a:rPr lang="en-ID" smtClean="0"/>
-              <a:t>17/02/2023</a:t>
+              <a:t>03/03/2023</a:t>
             </a:fld>
             <a:endParaRPr lang="en-ID"/>
           </a:p>
@@ -2263,7 +2268,7 @@
           <a:p>
             <a:fld id="{6640DF9F-1934-4AAD-B8C4-F17CDBD2A865}" type="datetimeFigureOut">
               <a:rPr lang="en-ID" smtClean="0"/>
-              <a:t>17/02/2023</a:t>
+              <a:t>03/03/2023</a:t>
             </a:fld>
             <a:endParaRPr lang="en-ID"/>
           </a:p>
@@ -2405,7 +2410,7 @@
           <a:p>
             <a:fld id="{6640DF9F-1934-4AAD-B8C4-F17CDBD2A865}" type="datetimeFigureOut">
               <a:rPr lang="en-ID" smtClean="0"/>
-              <a:t>17/02/2023</a:t>
+              <a:t>03/03/2023</a:t>
             </a:fld>
             <a:endParaRPr lang="en-ID"/>
           </a:p>
@@ -2518,7 +2523,7 @@
           <a:p>
             <a:fld id="{6640DF9F-1934-4AAD-B8C4-F17CDBD2A865}" type="datetimeFigureOut">
               <a:rPr lang="en-ID" smtClean="0"/>
-              <a:t>17/02/2023</a:t>
+              <a:t>03/03/2023</a:t>
             </a:fld>
             <a:endParaRPr lang="en-ID"/>
           </a:p>
@@ -2831,7 +2836,7 @@
           <a:p>
             <a:fld id="{6640DF9F-1934-4AAD-B8C4-F17CDBD2A865}" type="datetimeFigureOut">
               <a:rPr lang="en-ID" smtClean="0"/>
-              <a:t>17/02/2023</a:t>
+              <a:t>03/03/2023</a:t>
             </a:fld>
             <a:endParaRPr lang="en-ID"/>
           </a:p>
@@ -3120,7 +3125,7 @@
           <a:p>
             <a:fld id="{6640DF9F-1934-4AAD-B8C4-F17CDBD2A865}" type="datetimeFigureOut">
               <a:rPr lang="en-ID" smtClean="0"/>
-              <a:t>17/02/2023</a:t>
+              <a:t>03/03/2023</a:t>
             </a:fld>
             <a:endParaRPr lang="en-ID"/>
           </a:p>
@@ -3363,7 +3368,7 @@
           <a:p>
             <a:fld id="{6640DF9F-1934-4AAD-B8C4-F17CDBD2A865}" type="datetimeFigureOut">
               <a:rPr lang="en-ID" smtClean="0"/>
-              <a:t>17/02/2023</a:t>
+              <a:t>03/03/2023</a:t>
             </a:fld>
             <a:endParaRPr lang="en-ID"/>
           </a:p>
@@ -4404,7 +4409,7 @@
         </p:nvSpPr>
         <p:spPr>
           <a:xfrm>
-            <a:off x="6199574" y="64538"/>
+            <a:off x="6595864" y="115132"/>
             <a:ext cx="4116277" cy="1080681"/>
           </a:xfrm>
           <a:prstGeom prst="rect">
@@ -4636,7 +4641,7 @@
         </p:nvSpPr>
         <p:spPr>
           <a:xfrm>
-            <a:off x="4156476" y="5433708"/>
+            <a:off x="3953107" y="5418810"/>
             <a:ext cx="362259" cy="362259"/>
           </a:xfrm>
           <a:prstGeom prst="flowChartConnector">
@@ -5536,7 +5541,7 @@
         </p:nvSpPr>
         <p:spPr>
           <a:xfrm>
-            <a:off x="4435812" y="527811"/>
+            <a:off x="4457591" y="540481"/>
             <a:ext cx="491295" cy="668087"/>
           </a:xfrm>
           <a:prstGeom prst="rect">
@@ -5588,7 +5593,7 @@
         </p:nvSpPr>
         <p:spPr>
           <a:xfrm>
-            <a:off x="3888590" y="521520"/>
+            <a:off x="6025393" y="540482"/>
             <a:ext cx="491295" cy="668087"/>
           </a:xfrm>
           <a:prstGeom prst="rect">
@@ -5622,7 +5627,98 @@
           <a:lstStyle/>
           <a:p>
             <a:pPr algn="ctr"/>
-            <a:endParaRPr lang="en-ID"/>
+            <a:endParaRPr lang="en-ID" dirty="0"/>
+          </a:p>
+        </p:txBody>
+      </p:sp>
+      <p:sp>
+        <p:nvSpPr>
+          <p:cNvPr id="2" name="Rectangle 1">
+            <a:extLst>
+              <a:ext uri="{FF2B5EF4-FFF2-40B4-BE49-F238E27FC236}">
+                <a16:creationId xmlns:a16="http://schemas.microsoft.com/office/drawing/2014/main" id="{6CC1CE7E-D1B0-A308-DAD9-FEC2E3E6EFDA}"/>
+              </a:ext>
+            </a:extLst>
+          </p:cNvPr>
+          <p:cNvSpPr/>
+          <p:nvPr/>
+        </p:nvSpPr>
+        <p:spPr>
+          <a:xfrm>
+            <a:off x="9127784" y="3629506"/>
+            <a:ext cx="162267" cy="1258595"/>
+          </a:xfrm>
+          <a:prstGeom prst="rect">
+            <a:avLst/>
+          </a:prstGeom>
+          <a:solidFill>
+            <a:schemeClr val="accent6"/>
+          </a:solidFill>
+          <a:ln>
+            <a:noFill/>
+          </a:ln>
+        </p:spPr>
+        <p:style>
+          <a:lnRef idx="2">
+            <a:schemeClr val="accent1">
+              <a:shade val="50000"/>
+            </a:schemeClr>
+          </a:lnRef>
+          <a:fillRef idx="1">
+            <a:schemeClr val="accent1"/>
+          </a:fillRef>
+          <a:effectRef idx="0">
+            <a:schemeClr val="accent1"/>
+          </a:effectRef>
+          <a:fontRef idx="minor">
+            <a:schemeClr val="lt1"/>
+          </a:fontRef>
+        </p:style>
+        <p:txBody>
+          <a:bodyPr rtlCol="0" anchor="ctr"/>
+          <a:lstStyle/>
+          <a:p>
+            <a:pPr algn="ctr"/>
+            <a:endParaRPr lang="en-ID"/>
+          </a:p>
+        </p:txBody>
+      </p:sp>
+      <p:sp>
+        <p:nvSpPr>
+          <p:cNvPr id="3" name="TextBox 2">
+            <a:extLst>
+              <a:ext uri="{FF2B5EF4-FFF2-40B4-BE49-F238E27FC236}">
+                <a16:creationId xmlns:a16="http://schemas.microsoft.com/office/drawing/2014/main" id="{5BB6ECE2-4F47-1F0F-9EE8-24EC505E1AEE}"/>
+              </a:ext>
+            </a:extLst>
+          </p:cNvPr>
+          <p:cNvSpPr txBox="1"/>
+          <p:nvPr/>
+        </p:nvSpPr>
+        <p:spPr>
+          <a:xfrm>
+            <a:off x="145002" y="6359941"/>
+            <a:ext cx="535724" cy="369332"/>
+          </a:xfrm>
+          <a:prstGeom prst="rect">
+            <a:avLst/>
+          </a:prstGeom>
+          <a:noFill/>
+        </p:spPr>
+        <p:txBody>
+          <a:bodyPr wrap="none" rtlCol="0">
+            <a:spAutoFit/>
+          </a:bodyPr>
+          <a:lstStyle/>
+          <a:p>
+            <a:r>
+              <a:rPr lang="en-ID" b="1" dirty="0">
+                <a:solidFill>
+                  <a:schemeClr val="bg1"/>
+                </a:solidFill>
+              </a:rPr>
+              <a:t>111</a:t>
+            </a:r>
           </a:p>
         </p:txBody>
       </p:sp>
@@ -5724,30 +5820,28 @@
         </p:nvSpPr>
         <p:spPr>
           <a:xfrm>
-            <a:off x="166457" y="136865"/>
+            <a:off x="166458" y="136863"/>
             <a:ext cx="11859087" cy="6584271"/>
           </a:xfrm>
           <a:prstGeom prst="rect">
             <a:avLst/>
           </a:prstGeom>
           <a:solidFill>
-            <a:schemeClr val="accent6"/>
+            <a:schemeClr val="accent4"/>
           </a:solidFill>
           <a:ln>
             <a:noFill/>
           </a:ln>
         </p:spPr>
         <p:style>
-          <a:lnRef idx="2">
-            <a:schemeClr val="accent1">
-              <a:shade val="50000"/>
-            </a:schemeClr>
+          <a:lnRef idx="0">
+            <a:scrgbClr r="0" g="0" b="0"/>
           </a:lnRef>
-          <a:fillRef idx="1">
-            <a:schemeClr val="accent1"/>
+          <a:fillRef idx="0">
+            <a:scrgbClr r="0" g="0" b="0"/>
           </a:fillRef>
           <a:effectRef idx="0">
-            <a:schemeClr val="accent1"/>
+            <a:scrgbClr r="0" g="0" b="0"/>
           </a:effectRef>
           <a:fontRef idx="minor">
             <a:schemeClr val="lt1"/>

</xml_diff>